<commit_message>
Update code for demo
</commit_message>
<xml_diff>
--- a/PowerPoint/AngularJS.pptx
+++ b/PowerPoint/AngularJS.pptx
@@ -6,7 +6,7 @@
     <p:sldMasterId id="2147483648" r:id="rId6"/>
   </p:sldMasterIdLst>
   <p:notesMasterIdLst>
-    <p:notesMasterId r:id="rId24"/>
+    <p:notesMasterId r:id="rId26"/>
   </p:notesMasterIdLst>
   <p:sldIdLst>
     <p:sldId id="260" r:id="rId7"/>
@@ -15,17 +15,19 @@
     <p:sldId id="265" r:id="rId10"/>
     <p:sldId id="266" r:id="rId11"/>
     <p:sldId id="268" r:id="rId12"/>
-    <p:sldId id="269" r:id="rId13"/>
-    <p:sldId id="270" r:id="rId14"/>
-    <p:sldId id="279" r:id="rId15"/>
-    <p:sldId id="272" r:id="rId16"/>
-    <p:sldId id="276" r:id="rId17"/>
-    <p:sldId id="273" r:id="rId18"/>
-    <p:sldId id="280" r:id="rId19"/>
-    <p:sldId id="274" r:id="rId20"/>
-    <p:sldId id="275" r:id="rId21"/>
-    <p:sldId id="267" r:id="rId22"/>
-    <p:sldId id="277" r:id="rId23"/>
+    <p:sldId id="281" r:id="rId13"/>
+    <p:sldId id="269" r:id="rId14"/>
+    <p:sldId id="270" r:id="rId15"/>
+    <p:sldId id="279" r:id="rId16"/>
+    <p:sldId id="272" r:id="rId17"/>
+    <p:sldId id="276" r:id="rId18"/>
+    <p:sldId id="273" r:id="rId19"/>
+    <p:sldId id="280" r:id="rId20"/>
+    <p:sldId id="274" r:id="rId21"/>
+    <p:sldId id="275" r:id="rId22"/>
+    <p:sldId id="282" r:id="rId23"/>
+    <p:sldId id="267" r:id="rId24"/>
+    <p:sldId id="277" r:id="rId25"/>
   </p:sldIdLst>
   <p:sldSz cx="9144000" cy="5143500" type="screen16x9"/>
   <p:notesSz cx="7010400" cy="9296400"/>
@@ -225,7 +227,7 @@
           <a:p>
             <a:fld id="{6B25135B-B541-411A-8615-EEF133DB8D97}" type="datetimeFigureOut">
               <a:rPr lang="en-US" smtClean="0"/>
-              <a:t>5/6/2014</a:t>
+              <a:t>5/7/2014</a:t>
             </a:fld>
             <a:endParaRPr lang="en-US"/>
           </a:p>
@@ -1210,7 +1212,7 @@
           <a:p>
             <a:fld id="{2EE31933-6E70-4AFA-AB04-85E43741FC5F}" type="datetimeFigureOut">
               <a:rPr lang="en-US" smtClean="0"/>
-              <a:t>5/6/2014</a:t>
+              <a:t>5/7/2014</a:t>
             </a:fld>
             <a:endParaRPr lang="en-US"/>
           </a:p>
@@ -1706,7 +1708,7 @@
           <a:p>
             <a:fld id="{8EDBE830-22A8-47E2-9905-719E7398CD17}" type="datetimeFigureOut">
               <a:rPr lang="en-US" smtClean="0"/>
-              <a:t>5/6/2014</a:t>
+              <a:t>5/7/2014</a:t>
             </a:fld>
             <a:endParaRPr lang="en-US"/>
           </a:p>
@@ -2186,7 +2188,6 @@
               <a:rPr lang="en-US" dirty="0" smtClean="0"/>
               <a:t>Madison .NET User Group</a:t>
             </a:r>
-            <a:endParaRPr lang="en-US" dirty="0" smtClean="0"/>
           </a:p>
           <a:p>
             <a:endParaRPr lang="en-US" dirty="0" smtClean="0"/>
@@ -2250,14 +2251,26 @@
           <a:p>
             <a:r>
               <a:rPr lang="en-US" dirty="0" smtClean="0"/>
-              <a:t>Custom Logic</a:t>
-            </a:r>
-          </a:p>
-          <a:p>
-            <a:r>
-              <a:rPr lang="en-US" dirty="0" smtClean="0"/>
-              <a:t>Custom Filter function</a:t>
-            </a:r>
+              <a:t>Order </a:t>
+            </a:r>
+            <a:r>
+              <a:rPr lang="en-US" dirty="0"/>
+              <a:t>By</a:t>
+            </a:r>
+          </a:p>
+          <a:p>
+            <a:pPr lvl="1"/>
+            <a:r>
+              <a:rPr lang="en-US" dirty="0">
+                <a:hlinkClick r:id="rId2"/>
+              </a:rPr>
+              <a:t>http://docs.angularjs.org/api/ng.filter:orderBy</a:t>
+            </a:r>
+            <a:endParaRPr lang="en-US" dirty="0"/>
+          </a:p>
+          <a:p>
+            <a:pPr lvl="1"/>
+            <a:endParaRPr lang="en-US" dirty="0" smtClean="0"/>
           </a:p>
         </p:txBody>
       </p:sp>
@@ -2278,7 +2291,11 @@
           <a:p>
             <a:r>
               <a:rPr lang="en-US" dirty="0" smtClean="0"/>
-              <a:t>Demo 5 – Functions</a:t>
+              <a:t>Demo 4 </a:t>
+            </a:r>
+            <a:r>
+              <a:rPr lang="en-US" dirty="0" smtClean="0"/>
+              <a:t>– order</a:t>
             </a:r>
             <a:endParaRPr lang="en-US" dirty="0"/>
           </a:p>
@@ -2287,7 +2304,7 @@
     </p:spTree>
     <p:extLst>
       <p:ext uri="{BB962C8B-B14F-4D97-AF65-F5344CB8AC3E}">
-        <p14:creationId xmlns:p14="http://schemas.microsoft.com/office/powerpoint/2010/main" val="185142130"/>
+        <p14:creationId xmlns:p14="http://schemas.microsoft.com/office/powerpoint/2010/main" val="2315377052"/>
       </p:ext>
     </p:extLst>
   </p:cSld>
@@ -2338,80 +2355,25 @@
           <a:p>
             <a:r>
               <a:rPr lang="en-US" dirty="0" smtClean="0"/>
-              <a:t>Ng-show/</a:t>
-            </a:r>
-            <a:r>
-              <a:rPr lang="en-US" dirty="0" err="1" smtClean="0"/>
-              <a:t>ng</a:t>
-            </a:r>
-            <a:r>
-              <a:rPr lang="en-US" dirty="0" smtClean="0"/>
-              <a:t>-hide</a:t>
-            </a:r>
-          </a:p>
-          <a:p>
-            <a:pPr lvl="1"/>
-            <a:r>
-              <a:rPr lang="en-US" dirty="0">
-                <a:hlinkClick r:id="rId2"/>
-              </a:rPr>
-              <a:t>http://docs.angularjs.org/api/ng.directive:ngShow</a:t>
-            </a:r>
-            <a:r>
-              <a:rPr lang="en-US" dirty="0" smtClean="0">
-                <a:hlinkClick r:id="rId2"/>
-              </a:rPr>
-              <a:t>#!</a:t>
+              <a:t>Custom Logic</a:t>
+            </a:r>
+          </a:p>
+          <a:p>
+            <a:r>
+              <a:rPr lang="en-US" dirty="0" smtClean="0"/>
+              <a:t>Custom Filter </a:t>
+            </a:r>
+            <a:r>
+              <a:rPr lang="en-US" dirty="0" smtClean="0"/>
+              <a:t>function</a:t>
+            </a:r>
+          </a:p>
+          <a:p>
+            <a:r>
+              <a:rPr lang="en-US" dirty="0" smtClean="0"/>
+              <a:t>$log</a:t>
             </a:r>
             <a:endParaRPr lang="en-US" dirty="0" smtClean="0"/>
-          </a:p>
-          <a:p>
-            <a:pPr lvl="1"/>
-            <a:r>
-              <a:rPr lang="en-US" dirty="0">
-                <a:hlinkClick r:id="rId3"/>
-              </a:rPr>
-              <a:t>http://docs.angularjs.org/api/ng.directive:ngHide</a:t>
-            </a:r>
-            <a:endParaRPr lang="en-US" dirty="0" smtClean="0"/>
-          </a:p>
-          <a:p>
-            <a:r>
-              <a:rPr lang="en-US" dirty="0" smtClean="0"/>
-              <a:t>Ng-click</a:t>
-            </a:r>
-          </a:p>
-          <a:p>
-            <a:pPr lvl="1"/>
-            <a:r>
-              <a:rPr lang="en-US" dirty="0">
-                <a:hlinkClick r:id="rId4"/>
-              </a:rPr>
-              <a:t>http://</a:t>
-            </a:r>
-            <a:r>
-              <a:rPr lang="en-US" dirty="0" smtClean="0">
-                <a:hlinkClick r:id="rId4"/>
-              </a:rPr>
-              <a:t>docs.angularjs.org/api/ng.directive:ngClick</a:t>
-            </a:r>
-            <a:endParaRPr lang="en-US" dirty="0" smtClean="0"/>
-          </a:p>
-          <a:p>
-            <a:r>
-              <a:rPr lang="en-US" dirty="0" smtClean="0"/>
-              <a:t>Directives</a:t>
-            </a:r>
-          </a:p>
-          <a:p>
-            <a:pPr lvl="1"/>
-            <a:r>
-              <a:rPr lang="en-US" dirty="0">
-                <a:hlinkClick r:id="rId5"/>
-              </a:rPr>
-              <a:t>http://docs.angularjs.org/api/</a:t>
-            </a:r>
-            <a:endParaRPr lang="en-US" dirty="0"/>
           </a:p>
         </p:txBody>
       </p:sp>
@@ -2432,7 +2394,7 @@
           <a:p>
             <a:r>
               <a:rPr lang="en-US" dirty="0" smtClean="0"/>
-              <a:t>Demo 6 - Directives </a:t>
+              <a:t>Demo 5 – Functions</a:t>
             </a:r>
             <a:endParaRPr lang="en-US" dirty="0"/>
           </a:p>
@@ -2441,7 +2403,7 @@
     </p:spTree>
     <p:extLst>
       <p:ext uri="{BB962C8B-B14F-4D97-AF65-F5344CB8AC3E}">
-        <p14:creationId xmlns:p14="http://schemas.microsoft.com/office/powerpoint/2010/main" val="3546779680"/>
+        <p14:creationId xmlns:p14="http://schemas.microsoft.com/office/powerpoint/2010/main" val="185142130"/>
       </p:ext>
     </p:extLst>
   </p:cSld>
@@ -2492,14 +2454,80 @@
           <a:p>
             <a:r>
               <a:rPr lang="en-US" dirty="0" smtClean="0"/>
-              <a:t>Binding Images</a:t>
-            </a:r>
-          </a:p>
-          <a:p>
-            <a:r>
-              <a:rPr lang="en-US" dirty="0" smtClean="0"/>
-              <a:t>And something really cool</a:t>
-            </a:r>
+              <a:t>Ng-show/</a:t>
+            </a:r>
+            <a:r>
+              <a:rPr lang="en-US" dirty="0" err="1" smtClean="0"/>
+              <a:t>ng</a:t>
+            </a:r>
+            <a:r>
+              <a:rPr lang="en-US" dirty="0" smtClean="0"/>
+              <a:t>-hide</a:t>
+            </a:r>
+          </a:p>
+          <a:p>
+            <a:pPr lvl="1"/>
+            <a:r>
+              <a:rPr lang="en-US" dirty="0">
+                <a:hlinkClick r:id="rId2"/>
+              </a:rPr>
+              <a:t>http://docs.angularjs.org/api/ng.directive:ngShow</a:t>
+            </a:r>
+            <a:r>
+              <a:rPr lang="en-US" dirty="0" smtClean="0">
+                <a:hlinkClick r:id="rId2"/>
+              </a:rPr>
+              <a:t>#!</a:t>
+            </a:r>
+            <a:endParaRPr lang="en-US" dirty="0" smtClean="0"/>
+          </a:p>
+          <a:p>
+            <a:pPr lvl="1"/>
+            <a:r>
+              <a:rPr lang="en-US" dirty="0">
+                <a:hlinkClick r:id="rId3"/>
+              </a:rPr>
+              <a:t>http://docs.angularjs.org/api/ng.directive:ngHide</a:t>
+            </a:r>
+            <a:endParaRPr lang="en-US" dirty="0" smtClean="0"/>
+          </a:p>
+          <a:p>
+            <a:r>
+              <a:rPr lang="en-US" dirty="0" smtClean="0"/>
+              <a:t>Ng-click</a:t>
+            </a:r>
+          </a:p>
+          <a:p>
+            <a:pPr lvl="1"/>
+            <a:r>
+              <a:rPr lang="en-US" dirty="0">
+                <a:hlinkClick r:id="rId4"/>
+              </a:rPr>
+              <a:t>http://</a:t>
+            </a:r>
+            <a:r>
+              <a:rPr lang="en-US" dirty="0" smtClean="0">
+                <a:hlinkClick r:id="rId4"/>
+              </a:rPr>
+              <a:t>docs.angularjs.org/api/ng.directive:ngClick</a:t>
+            </a:r>
+            <a:endParaRPr lang="en-US" dirty="0" smtClean="0"/>
+          </a:p>
+          <a:p>
+            <a:r>
+              <a:rPr lang="en-US" dirty="0" smtClean="0"/>
+              <a:t>Directives</a:t>
+            </a:r>
+          </a:p>
+          <a:p>
+            <a:pPr lvl="1"/>
+            <a:r>
+              <a:rPr lang="en-US" dirty="0">
+                <a:hlinkClick r:id="rId5"/>
+              </a:rPr>
+              <a:t>http://docs.angularjs.org/api/</a:t>
+            </a:r>
+            <a:endParaRPr lang="en-US" dirty="0"/>
           </a:p>
         </p:txBody>
       </p:sp>
@@ -2520,7 +2548,7 @@
           <a:p>
             <a:r>
               <a:rPr lang="en-US" dirty="0" smtClean="0"/>
-              <a:t>Demo Lou – A brief Interlude</a:t>
+              <a:t>Demo 6 - Directives </a:t>
             </a:r>
             <a:endParaRPr lang="en-US" dirty="0"/>
           </a:p>
@@ -2529,7 +2557,7 @@
     </p:spTree>
     <p:extLst>
       <p:ext uri="{BB962C8B-B14F-4D97-AF65-F5344CB8AC3E}">
-        <p14:creationId xmlns:p14="http://schemas.microsoft.com/office/powerpoint/2010/main" val="1461776896"/>
+        <p14:creationId xmlns:p14="http://schemas.microsoft.com/office/powerpoint/2010/main" val="3546779680"/>
       </p:ext>
     </p:extLst>
   </p:cSld>
@@ -2580,21 +2608,14 @@
           <a:p>
             <a:r>
               <a:rPr lang="en-US" dirty="0" smtClean="0"/>
-              <a:t>Enable controlling of UX</a:t>
-            </a:r>
-          </a:p>
-          <a:p>
-            <a:r>
-              <a:rPr lang="en-US" dirty="0" smtClean="0"/>
-              <a:t>Separate work large products</a:t>
-            </a:r>
-          </a:p>
-          <a:p>
-            <a:r>
-              <a:rPr lang="en-US"/>
-              <a:t>http://docs.angularjs.org/guide/templates#!</a:t>
-            </a:r>
-            <a:endParaRPr lang="en-US" dirty="0" smtClean="0"/>
+              <a:t>Binding Images</a:t>
+            </a:r>
+          </a:p>
+          <a:p>
+            <a:r>
+              <a:rPr lang="en-US" dirty="0" smtClean="0"/>
+              <a:t>And something really cool</a:t>
+            </a:r>
           </a:p>
         </p:txBody>
       </p:sp>
@@ -2615,7 +2636,7 @@
           <a:p>
             <a:r>
               <a:rPr lang="en-US" dirty="0" smtClean="0"/>
-              <a:t>Demo 8 – Templates</a:t>
+              <a:t>Demo Lou – A brief Interlude</a:t>
             </a:r>
             <a:endParaRPr lang="en-US" dirty="0"/>
           </a:p>
@@ -2624,7 +2645,7 @@
     </p:spTree>
     <p:extLst>
       <p:ext uri="{BB962C8B-B14F-4D97-AF65-F5344CB8AC3E}">
-        <p14:creationId xmlns:p14="http://schemas.microsoft.com/office/powerpoint/2010/main" val="549008580"/>
+        <p14:creationId xmlns:p14="http://schemas.microsoft.com/office/powerpoint/2010/main" val="1461776896"/>
       </p:ext>
     </p:extLst>
   </p:cSld>
@@ -2668,59 +2689,28 @@
             <p:ph type="body" sz="quarter" idx="11"/>
           </p:nvPr>
         </p:nvSpPr>
-        <p:spPr>
-          <a:xfrm>
-            <a:off x="762000" y="1047750"/>
-            <a:ext cx="7620000" cy="3886200"/>
-          </a:xfrm>
-        </p:spPr>
+        <p:spPr/>
         <p:txBody>
           <a:bodyPr/>
           <a:lstStyle/>
           <a:p>
             <a:r>
               <a:rPr lang="en-US" dirty="0" smtClean="0"/>
-              <a:t>Encapsulate logic</a:t>
-            </a:r>
-          </a:p>
-          <a:p>
-            <a:pPr lvl="1"/>
-            <a:r>
-              <a:rPr lang="en-US" dirty="0" smtClean="0"/>
-              <a:t>Linked together via Dependency injection</a:t>
-            </a:r>
-          </a:p>
-          <a:p>
-            <a:pPr lvl="1"/>
-            <a:r>
-              <a:rPr lang="en-US" dirty="0">
-                <a:hlinkClick r:id="rId2"/>
-              </a:rPr>
-              <a:t>http://</a:t>
-            </a:r>
-            <a:r>
-              <a:rPr lang="en-US" dirty="0" smtClean="0">
-                <a:hlinkClick r:id="rId2"/>
-              </a:rPr>
-              <a:t>docs.angularjs.org/guide/dev_guide.services.creating_services</a:t>
+              <a:t>Enable controlling of UX</a:t>
+            </a:r>
+          </a:p>
+          <a:p>
+            <a:r>
+              <a:rPr lang="en-US" dirty="0" smtClean="0"/>
+              <a:t>Separate work large products</a:t>
+            </a:r>
+          </a:p>
+          <a:p>
+            <a:r>
+              <a:rPr lang="en-US"/>
+              <a:t>http://docs.angularjs.org/guide/templates#!</a:t>
             </a:r>
             <a:endParaRPr lang="en-US" dirty="0" smtClean="0"/>
-          </a:p>
-          <a:p>
-            <a:r>
-              <a:rPr lang="en-US" dirty="0" smtClean="0"/>
-              <a:t>Promises - $q</a:t>
-            </a:r>
-          </a:p>
-          <a:p>
-            <a:pPr lvl="1"/>
-            <a:r>
-              <a:rPr lang="en-US" dirty="0">
-                <a:hlinkClick r:id="rId3"/>
-              </a:rPr>
-              <a:t>http://docs.angularjs.org/api/ng.$q</a:t>
-            </a:r>
-            <a:endParaRPr lang="en-US" dirty="0"/>
           </a:p>
         </p:txBody>
       </p:sp>
@@ -2741,7 +2731,7 @@
           <a:p>
             <a:r>
               <a:rPr lang="en-US" dirty="0" smtClean="0"/>
-              <a:t>Demo 9 - Services</a:t>
+              <a:t>Demo 8 – Templates</a:t>
             </a:r>
             <a:endParaRPr lang="en-US" dirty="0"/>
           </a:p>
@@ -2750,7 +2740,7 @@
     </p:spTree>
     <p:extLst>
       <p:ext uri="{BB962C8B-B14F-4D97-AF65-F5344CB8AC3E}">
-        <p14:creationId xmlns:p14="http://schemas.microsoft.com/office/powerpoint/2010/main" val="1850712121"/>
+        <p14:creationId xmlns:p14="http://schemas.microsoft.com/office/powerpoint/2010/main" val="549008580"/>
       </p:ext>
     </p:extLst>
   </p:cSld>
@@ -2794,15 +2784,59 @@
             <p:ph type="body" sz="quarter" idx="11"/>
           </p:nvPr>
         </p:nvSpPr>
-        <p:spPr/>
+        <p:spPr>
+          <a:xfrm>
+            <a:off x="762000" y="1047750"/>
+            <a:ext cx="7620000" cy="3886200"/>
+          </a:xfrm>
+        </p:spPr>
         <p:txBody>
           <a:bodyPr/>
           <a:lstStyle/>
           <a:p>
             <a:r>
               <a:rPr lang="en-US" dirty="0" smtClean="0"/>
-              <a:t>Create new elements!</a:t>
-            </a:r>
+              <a:t>Encapsulate logic</a:t>
+            </a:r>
+          </a:p>
+          <a:p>
+            <a:pPr lvl="1"/>
+            <a:r>
+              <a:rPr lang="en-US" dirty="0" smtClean="0"/>
+              <a:t>Linked together via Dependency injection</a:t>
+            </a:r>
+          </a:p>
+          <a:p>
+            <a:pPr lvl="1"/>
+            <a:r>
+              <a:rPr lang="en-US" dirty="0">
+                <a:hlinkClick r:id="rId2"/>
+              </a:rPr>
+              <a:t>http://</a:t>
+            </a:r>
+            <a:r>
+              <a:rPr lang="en-US" dirty="0" smtClean="0">
+                <a:hlinkClick r:id="rId2"/>
+              </a:rPr>
+              <a:t>docs.angularjs.org/guide/dev_guide.services.creating_services</a:t>
+            </a:r>
+            <a:endParaRPr lang="en-US" dirty="0" smtClean="0"/>
+          </a:p>
+          <a:p>
+            <a:r>
+              <a:rPr lang="en-US" dirty="0" smtClean="0"/>
+              <a:t>Promises - $q</a:t>
+            </a:r>
+          </a:p>
+          <a:p>
+            <a:pPr lvl="1"/>
+            <a:r>
+              <a:rPr lang="en-US" dirty="0">
+                <a:hlinkClick r:id="rId3"/>
+              </a:rPr>
+              <a:t>http://docs.angularjs.org/api/ng.$q</a:t>
+            </a:r>
+            <a:endParaRPr lang="en-US" dirty="0"/>
           </a:p>
         </p:txBody>
       </p:sp>
@@ -2822,12 +2856,8 @@
           <a:lstStyle/>
           <a:p>
             <a:r>
-              <a:rPr lang="en-US" smtClean="0"/>
-              <a:t>Demo 10 </a:t>
-            </a:r>
-            <a:r>
-              <a:rPr lang="en-US" dirty="0" smtClean="0"/>
-              <a:t>– Data binding</a:t>
+              <a:rPr lang="en-US" dirty="0" smtClean="0"/>
+              <a:t>Demo 9 - Services</a:t>
             </a:r>
             <a:endParaRPr lang="en-US" dirty="0"/>
           </a:p>
@@ -2836,7 +2866,7 @@
     </p:spTree>
     <p:extLst>
       <p:ext uri="{BB962C8B-B14F-4D97-AF65-F5344CB8AC3E}">
-        <p14:creationId xmlns:p14="http://schemas.microsoft.com/office/powerpoint/2010/main" val="3873067040"/>
+        <p14:creationId xmlns:p14="http://schemas.microsoft.com/office/powerpoint/2010/main" val="1850712121"/>
       </p:ext>
     </p:extLst>
   </p:cSld>
@@ -2885,6 +2915,215 @@
           <a:bodyPr/>
           <a:lstStyle/>
           <a:p>
+            <a:r>
+              <a:rPr lang="en-US" dirty="0" smtClean="0"/>
+              <a:t>Create new elements!</a:t>
+            </a:r>
+          </a:p>
+        </p:txBody>
+      </p:sp>
+      <p:sp>
+        <p:nvSpPr>
+          <p:cNvPr id="3" name="Title 2"/>
+          <p:cNvSpPr>
+            <a:spLocks noGrp="1"/>
+          </p:cNvSpPr>
+          <p:nvPr>
+            <p:ph type="title"/>
+          </p:nvPr>
+        </p:nvSpPr>
+        <p:spPr/>
+        <p:txBody>
+          <a:bodyPr/>
+          <a:lstStyle/>
+          <a:p>
+            <a:r>
+              <a:rPr lang="en-US" smtClean="0"/>
+              <a:t>Demo 10 </a:t>
+            </a:r>
+            <a:r>
+              <a:rPr lang="en-US" dirty="0" smtClean="0"/>
+              <a:t>– Data binding</a:t>
+            </a:r>
+            <a:endParaRPr lang="en-US" dirty="0"/>
+          </a:p>
+        </p:txBody>
+      </p:sp>
+    </p:spTree>
+    <p:extLst>
+      <p:ext uri="{BB962C8B-B14F-4D97-AF65-F5344CB8AC3E}">
+        <p14:creationId xmlns:p14="http://schemas.microsoft.com/office/powerpoint/2010/main" val="3873067040"/>
+      </p:ext>
+    </p:extLst>
+  </p:cSld>
+  <p:clrMapOvr>
+    <a:masterClrMapping/>
+  </p:clrMapOvr>
+  <p:timing>
+    <p:tnLst>
+      <p:par>
+        <p:cTn id="1" dur="indefinite" restart="never" nodeType="tmRoot"/>
+      </p:par>
+    </p:tnLst>
+  </p:timing>
+</p:sld>
+</file>
+
+<file path=ppt/slides/slide17.xml><?xml version="1.0" encoding="utf-8"?>
+<p:sld xmlns:a="http://schemas.openxmlformats.org/drawingml/2006/main" xmlns:r="http://schemas.openxmlformats.org/officeDocument/2006/relationships" xmlns:p="http://schemas.openxmlformats.org/presentationml/2006/main">
+  <p:cSld>
+    <p:spTree>
+      <p:nvGrpSpPr>
+        <p:cNvPr id="1" name=""/>
+        <p:cNvGrpSpPr/>
+        <p:nvPr/>
+      </p:nvGrpSpPr>
+      <p:grpSpPr>
+        <a:xfrm>
+          <a:off x="0" y="0"/>
+          <a:ext cx="0" cy="0"/>
+          <a:chOff x="0" y="0"/>
+          <a:chExt cx="0" cy="0"/>
+        </a:xfrm>
+      </p:grpSpPr>
+      <p:sp>
+        <p:nvSpPr>
+          <p:cNvPr id="2" name="Text Placeholder 1"/>
+          <p:cNvSpPr>
+            <a:spLocks noGrp="1"/>
+          </p:cNvSpPr>
+          <p:nvPr>
+            <p:ph type="body" sz="quarter" idx="11"/>
+          </p:nvPr>
+        </p:nvSpPr>
+        <p:spPr/>
+        <p:txBody>
+          <a:bodyPr/>
+          <a:lstStyle/>
+          <a:p>
+            <a:r>
+              <a:rPr lang="en-US" dirty="0" smtClean="0"/>
+              <a:t>Ng-route JavaScript</a:t>
+            </a:r>
+          </a:p>
+          <a:p>
+            <a:r>
+              <a:rPr lang="en-US" dirty="0" smtClean="0"/>
+              <a:t>Dependency Injection</a:t>
+            </a:r>
+          </a:p>
+          <a:p>
+            <a:r>
+              <a:rPr lang="en-US" dirty="0" smtClean="0"/>
+              <a:t>$</a:t>
+            </a:r>
+            <a:r>
+              <a:rPr lang="en-US" dirty="0" err="1" smtClean="0"/>
+              <a:t>routeProvider</a:t>
+            </a:r>
+            <a:r>
+              <a:rPr lang="en-US" dirty="0" smtClean="0"/>
+              <a:t> and route creation</a:t>
+            </a:r>
+          </a:p>
+          <a:p>
+            <a:r>
+              <a:rPr lang="en-US" dirty="0" smtClean="0"/>
+              <a:t>Introduce ng-view</a:t>
+            </a:r>
+          </a:p>
+          <a:p>
+            <a:endParaRPr lang="en-US" dirty="0" smtClean="0"/>
+          </a:p>
+        </p:txBody>
+      </p:sp>
+      <p:sp>
+        <p:nvSpPr>
+          <p:cNvPr id="3" name="Title 2"/>
+          <p:cNvSpPr>
+            <a:spLocks noGrp="1"/>
+          </p:cNvSpPr>
+          <p:nvPr>
+            <p:ph type="title"/>
+          </p:nvPr>
+        </p:nvSpPr>
+        <p:spPr/>
+        <p:txBody>
+          <a:bodyPr/>
+          <a:lstStyle/>
+          <a:p>
+            <a:r>
+              <a:rPr lang="en-US" dirty="0" smtClean="0"/>
+              <a:t>Demo </a:t>
+            </a:r>
+            <a:r>
+              <a:rPr lang="en-US" dirty="0" smtClean="0"/>
+              <a:t>11 </a:t>
+            </a:r>
+            <a:r>
+              <a:rPr lang="en-US" dirty="0" smtClean="0"/>
+              <a:t>– </a:t>
+            </a:r>
+            <a:r>
+              <a:rPr lang="en-US" dirty="0" smtClean="0"/>
+              <a:t>Routes</a:t>
+            </a:r>
+            <a:endParaRPr lang="en-US" dirty="0"/>
+          </a:p>
+        </p:txBody>
+      </p:sp>
+    </p:spTree>
+    <p:extLst>
+      <p:ext uri="{BB962C8B-B14F-4D97-AF65-F5344CB8AC3E}">
+        <p14:creationId xmlns:p14="http://schemas.microsoft.com/office/powerpoint/2010/main" val="1914701397"/>
+      </p:ext>
+    </p:extLst>
+  </p:cSld>
+  <p:clrMapOvr>
+    <a:masterClrMapping/>
+  </p:clrMapOvr>
+  <p:timing>
+    <p:tnLst>
+      <p:par>
+        <p:cTn id="1" dur="indefinite" restart="never" nodeType="tmRoot"/>
+      </p:par>
+    </p:tnLst>
+  </p:timing>
+</p:sld>
+</file>
+
+<file path=ppt/slides/slide18.xml><?xml version="1.0" encoding="utf-8"?>
+<p:sld xmlns:a="http://schemas.openxmlformats.org/drawingml/2006/main" xmlns:r="http://schemas.openxmlformats.org/officeDocument/2006/relationships" xmlns:p="http://schemas.openxmlformats.org/presentationml/2006/main">
+  <p:cSld>
+    <p:spTree>
+      <p:nvGrpSpPr>
+        <p:cNvPr id="1" name=""/>
+        <p:cNvGrpSpPr/>
+        <p:nvPr/>
+      </p:nvGrpSpPr>
+      <p:grpSpPr>
+        <a:xfrm>
+          <a:off x="0" y="0"/>
+          <a:ext cx="0" cy="0"/>
+          <a:chOff x="0" y="0"/>
+          <a:chExt cx="0" cy="0"/>
+        </a:xfrm>
+      </p:grpSpPr>
+      <p:sp>
+        <p:nvSpPr>
+          <p:cNvPr id="2" name="Text Placeholder 1"/>
+          <p:cNvSpPr>
+            <a:spLocks noGrp="1"/>
+          </p:cNvSpPr>
+          <p:nvPr>
+            <p:ph type="body" sz="quarter" idx="11"/>
+          </p:nvPr>
+        </p:nvSpPr>
+        <p:spPr/>
+        <p:txBody>
+          <a:bodyPr/>
+          <a:lstStyle/>
+          <a:p>
             <a:pPr marL="0" indent="0" algn="ctr">
               <a:buNone/>
             </a:pPr>
@@ -2935,7 +3174,7 @@
 </p:sld>
 </file>
 
-<file path=ppt/slides/slide17.xml><?xml version="1.0" encoding="utf-8"?>
+<file path=ppt/slides/slide19.xml><?xml version="1.0" encoding="utf-8"?>
 <p:sld xmlns:a="http://schemas.openxmlformats.org/drawingml/2006/main" xmlns:r="http://schemas.openxmlformats.org/officeDocument/2006/relationships" xmlns:p="http://schemas.openxmlformats.org/presentationml/2006/main">
   <p:cSld>
     <p:spTree>
@@ -3596,49 +3835,25 @@
             <a:endParaRPr lang="en-US" dirty="0" smtClean="0"/>
           </a:p>
           <a:p>
-            <a:r>
-              <a:rPr lang="en-US" dirty="0" smtClean="0"/>
-              <a:t>Ng-app, </a:t>
-            </a:r>
-            <a:r>
-              <a:rPr lang="en-US" dirty="0" err="1" smtClean="0"/>
-              <a:t>ng</a:t>
-            </a:r>
-            <a:r>
-              <a:rPr lang="en-US" dirty="0" smtClean="0"/>
-              <a:t>-model</a:t>
-            </a:r>
-          </a:p>
-          <a:p>
-            <a:r>
-              <a:rPr lang="en-US" dirty="0" smtClean="0"/>
-              <a:t>Magical {{}}</a:t>
-            </a:r>
-          </a:p>
-          <a:p>
-            <a:r>
-              <a:rPr lang="en-US" dirty="0" smtClean="0"/>
-              <a:t>Filters</a:t>
-            </a:r>
-          </a:p>
-          <a:p>
             <a:pPr lvl="1"/>
             <a:r>
-              <a:rPr lang="en-US" dirty="0">
-                <a:hlinkClick r:id="rId2"/>
-              </a:rPr>
-              <a:t>http://</a:t>
-            </a:r>
-            <a:r>
-              <a:rPr lang="en-US" dirty="0" smtClean="0">
-                <a:hlinkClick r:id="rId2"/>
-              </a:rPr>
-              <a:t>docs.angularjs.org/api/ng#filter</a:t>
-            </a:r>
-            <a:endParaRPr lang="en-US" dirty="0" smtClean="0"/>
+              <a:rPr lang="en-US" dirty="0"/>
+              <a:t>https://angularjs.org/</a:t>
+            </a:r>
+            <a:endParaRPr lang="en-US" dirty="0"/>
+          </a:p>
+          <a:p>
+            <a:r>
+              <a:rPr lang="en-US" dirty="0" smtClean="0"/>
+              <a:t>Bootstrap</a:t>
+            </a:r>
           </a:p>
           <a:p>
             <a:pPr lvl="1"/>
+            <a:r>
+              <a:rPr lang="en-US" dirty="0"/>
+              <a:t>http://getbootstrap.com/</a:t>
+            </a:r>
             <a:endParaRPr lang="en-US" dirty="0" smtClean="0"/>
           </a:p>
         </p:txBody>
@@ -3660,7 +3875,11 @@
           <a:p>
             <a:r>
               <a:rPr lang="en-US" dirty="0" smtClean="0"/>
-              <a:t>Demo 1 - Intro/Data Binding</a:t>
+              <a:t>Demo </a:t>
+            </a:r>
+            <a:r>
+              <a:rPr lang="en-US" dirty="0" smtClean="0"/>
+              <a:t>0 - Groundwork</a:t>
             </a:r>
             <a:endParaRPr lang="en-US" dirty="0"/>
           </a:p>
@@ -3720,7 +3939,23 @@
           <a:p>
             <a:r>
               <a:rPr lang="en-US" dirty="0" smtClean="0"/>
-              <a:t>Ng-controller</a:t>
+              <a:t>Ng-app</a:t>
+            </a:r>
+            <a:r>
+              <a:rPr lang="en-US" dirty="0" smtClean="0"/>
+              <a:t>, ng-model</a:t>
+            </a:r>
+          </a:p>
+          <a:p>
+            <a:r>
+              <a:rPr lang="en-US" dirty="0" smtClean="0"/>
+              <a:t>Magical {{}}</a:t>
+            </a:r>
+          </a:p>
+          <a:p>
+            <a:r>
+              <a:rPr lang="en-US" dirty="0" smtClean="0"/>
+              <a:t>Filters</a:t>
             </a:r>
           </a:p>
           <a:p>
@@ -3729,35 +3964,19 @@
               <a:rPr lang="en-US" dirty="0">
                 <a:hlinkClick r:id="rId2"/>
               </a:rPr>
-              <a:t>http://docs.angularjs.org/api/ng.$</a:t>
+              <a:t>http://</a:t>
             </a:r>
             <a:r>
               <a:rPr lang="en-US" dirty="0" smtClean="0">
                 <a:hlinkClick r:id="rId2"/>
               </a:rPr>
-              <a:t>controller</a:t>
+              <a:t>docs.angularjs.org/api/ng#filter</a:t>
             </a:r>
             <a:endParaRPr lang="en-US" dirty="0" smtClean="0"/>
           </a:p>
           <a:p>
-            <a:r>
-              <a:rPr lang="en-US" dirty="0" smtClean="0"/>
-              <a:t>Magical $scope</a:t>
-            </a:r>
-          </a:p>
-          <a:p>
             <a:pPr lvl="1"/>
-            <a:r>
-              <a:rPr lang="en-US" dirty="0" smtClean="0"/>
-              <a:t>View model</a:t>
-            </a:r>
-          </a:p>
-          <a:p>
-            <a:pPr lvl="1"/>
-            <a:r>
-              <a:rPr lang="en-US" dirty="0" smtClean="0"/>
-              <a:t>Object context</a:t>
-            </a:r>
+            <a:endParaRPr lang="en-US" dirty="0" smtClean="0"/>
           </a:p>
         </p:txBody>
       </p:sp>
@@ -3778,7 +3997,7 @@
           <a:p>
             <a:r>
               <a:rPr lang="en-US" dirty="0" smtClean="0"/>
-              <a:t>Demo 2 - Controllers</a:t>
+              <a:t>Demo 1 - Intro/Data Binding</a:t>
             </a:r>
             <a:endParaRPr lang="en-US" dirty="0"/>
           </a:p>
@@ -3787,7 +4006,7 @@
     </p:spTree>
     <p:extLst>
       <p:ext uri="{BB962C8B-B14F-4D97-AF65-F5344CB8AC3E}">
-        <p14:creationId xmlns:p14="http://schemas.microsoft.com/office/powerpoint/2010/main" val="1307488684"/>
+        <p14:creationId xmlns:p14="http://schemas.microsoft.com/office/powerpoint/2010/main" val="2646358429"/>
       </p:ext>
     </p:extLst>
   </p:cSld>
@@ -3838,30 +4057,7 @@
           <a:p>
             <a:r>
               <a:rPr lang="en-US" dirty="0" smtClean="0"/>
-              <a:t>Directives</a:t>
-            </a:r>
-          </a:p>
-          <a:p>
-            <a:pPr lvl="1"/>
-            <a:r>
-              <a:rPr lang="en-US" dirty="0" smtClean="0"/>
-              <a:t>HTML Dom markers (attributes, </a:t>
-            </a:r>
-            <a:r>
-              <a:rPr lang="en-US" dirty="0" err="1" smtClean="0"/>
-              <a:t>css</a:t>
-            </a:r>
-            <a:r>
-              <a:rPr lang="en-US" dirty="0" smtClean="0"/>
-              <a:t> class, </a:t>
-            </a:r>
-            <a:r>
-              <a:rPr lang="en-US" dirty="0" err="1" smtClean="0"/>
-              <a:t>etc</a:t>
-            </a:r>
-            <a:r>
-              <a:rPr lang="en-US" dirty="0" smtClean="0"/>
-              <a:t>)</a:t>
+              <a:t>Ng-controller</a:t>
             </a:r>
           </a:p>
           <a:p>
@@ -3870,39 +4066,45 @@
               <a:rPr lang="en-US" dirty="0">
                 <a:hlinkClick r:id="rId2"/>
               </a:rPr>
-              <a:t>http://</a:t>
+              <a:t>http://docs.angularjs.org/api/ng.$</a:t>
             </a:r>
             <a:r>
               <a:rPr lang="en-US" dirty="0" smtClean="0">
                 <a:hlinkClick r:id="rId2"/>
               </a:rPr>
-              <a:t>docs.angularjs.org/guide/directive</a:t>
-            </a:r>
-            <a:r>
-              <a:rPr lang="en-US" dirty="0" smtClean="0"/>
-              <a:t> </a:t>
-            </a:r>
-            <a:endParaRPr lang="en-US" dirty="0"/>
-          </a:p>
-          <a:p>
-            <a:r>
-              <a:rPr lang="en-US" dirty="0" smtClean="0"/>
-              <a:t>Ng-repeat</a:t>
+              <a:t>controller</a:t>
+            </a:r>
+            <a:endParaRPr lang="en-US" dirty="0" smtClean="0"/>
+          </a:p>
+          <a:p>
+            <a:r>
+              <a:rPr lang="en-US" dirty="0" smtClean="0"/>
+              <a:t>Magical $scope</a:t>
             </a:r>
           </a:p>
           <a:p>
             <a:pPr lvl="1"/>
             <a:r>
-              <a:rPr lang="en-US" dirty="0">
-                <a:hlinkClick r:id="rId3"/>
-              </a:rPr>
-              <a:t>http://</a:t>
-            </a:r>
-            <a:r>
-              <a:rPr lang="en-US" dirty="0" smtClean="0">
-                <a:hlinkClick r:id="rId3"/>
-              </a:rPr>
-              <a:t>docs.angularjs.org/api/ng.directive:ngRepeat</a:t>
+              <a:rPr lang="en-US" dirty="0" smtClean="0"/>
+              <a:t>View model</a:t>
+            </a:r>
+          </a:p>
+          <a:p>
+            <a:pPr lvl="1"/>
+            <a:r>
+              <a:rPr lang="en-US" dirty="0" smtClean="0"/>
+              <a:t>Object </a:t>
+            </a:r>
+            <a:r>
+              <a:rPr lang="en-US" dirty="0" smtClean="0"/>
+              <a:t>context</a:t>
+            </a:r>
+          </a:p>
+          <a:p>
+            <a:pPr lvl="1"/>
+            <a:r>
+              <a:rPr lang="en-US" dirty="0" smtClean="0"/>
+              <a:t>Both controllers and directives have access to scope, but not each to other</a:t>
             </a:r>
             <a:endParaRPr lang="en-US" dirty="0" smtClean="0"/>
           </a:p>
@@ -3925,11 +4127,7 @@
           <a:p>
             <a:r>
               <a:rPr lang="en-US" dirty="0" smtClean="0"/>
-              <a:t>Demo 3 –</a:t>
-            </a:r>
-            <a:r>
-              <a:rPr lang="en-US" dirty="0" err="1" smtClean="0"/>
-              <a:t>RepeaT</a:t>
+              <a:t>Demo 2 - Controllers</a:t>
             </a:r>
             <a:endParaRPr lang="en-US" dirty="0"/>
           </a:p>
@@ -3938,7 +4136,7 @@
     </p:spTree>
     <p:extLst>
       <p:ext uri="{BB962C8B-B14F-4D97-AF65-F5344CB8AC3E}">
-        <p14:creationId xmlns:p14="http://schemas.microsoft.com/office/powerpoint/2010/main" val="919005457"/>
+        <p14:creationId xmlns:p14="http://schemas.microsoft.com/office/powerpoint/2010/main" val="1307488684"/>
       </p:ext>
     </p:extLst>
   </p:cSld>
@@ -3989,7 +4187,30 @@
           <a:p>
             <a:r>
               <a:rPr lang="en-US" dirty="0" smtClean="0"/>
-              <a:t>Ng-filter</a:t>
+              <a:t>Directives</a:t>
+            </a:r>
+          </a:p>
+          <a:p>
+            <a:pPr lvl="1"/>
+            <a:r>
+              <a:rPr lang="en-US" dirty="0" smtClean="0"/>
+              <a:t>HTML Dom markers (attributes, </a:t>
+            </a:r>
+            <a:r>
+              <a:rPr lang="en-US" dirty="0" err="1" smtClean="0"/>
+              <a:t>css</a:t>
+            </a:r>
+            <a:r>
+              <a:rPr lang="en-US" dirty="0" smtClean="0"/>
+              <a:t> class, </a:t>
+            </a:r>
+            <a:r>
+              <a:rPr lang="en-US" dirty="0" err="1" smtClean="0"/>
+              <a:t>etc</a:t>
+            </a:r>
+            <a:r>
+              <a:rPr lang="en-US" dirty="0" smtClean="0"/>
+              <a:t>)</a:t>
             </a:r>
           </a:p>
           <a:p>
@@ -4004,32 +4225,51 @@
               <a:rPr lang="en-US" dirty="0" smtClean="0">
                 <a:hlinkClick r:id="rId2"/>
               </a:rPr>
-              <a:t>docs.angularjs.org/api/ng.filter:filter</a:t>
-            </a:r>
-            <a:endParaRPr lang="en-US" dirty="0" smtClean="0"/>
-          </a:p>
-          <a:p>
-            <a:r>
-              <a:rPr lang="en-US" dirty="0" smtClean="0"/>
-              <a:t>Order </a:t>
-            </a:r>
-            <a:r>
-              <a:rPr lang="en-US" dirty="0"/>
-              <a:t>By</a:t>
+              <a:t>docs.angularjs.org/guide/directive</a:t>
+            </a:r>
+            <a:r>
+              <a:rPr lang="en-US" dirty="0" smtClean="0"/>
+              <a:t> </a:t>
+            </a:r>
+            <a:endParaRPr lang="en-US" dirty="0"/>
+          </a:p>
+          <a:p>
+            <a:r>
+              <a:rPr lang="en-US" dirty="0" smtClean="0"/>
+              <a:t>Ng-repeat</a:t>
             </a:r>
           </a:p>
           <a:p>
             <a:pPr lvl="1"/>
             <a:r>
-              <a:rPr lang="en-US" dirty="0">
+              <a:rPr lang="en-US" dirty="0" smtClean="0">
                 <a:hlinkClick r:id="rId3"/>
               </a:rPr>
-              <a:t>http://docs.angularjs.org/api/ng.filter:orderBy</a:t>
+              <a:t>http://docs.angularjs.org/api/ng.directive:ngRepeat</a:t>
             </a:r>
             <a:endParaRPr lang="en-US" dirty="0"/>
           </a:p>
           <a:p>
+            <a:r>
+              <a:rPr lang="en-US" dirty="0" smtClean="0"/>
+              <a:t>Ng-filter</a:t>
+            </a:r>
+            <a:endParaRPr lang="en-US" dirty="0"/>
+          </a:p>
+          <a:p>
             <a:pPr lvl="1"/>
+            <a:r>
+              <a:rPr lang="en-US" dirty="0">
+                <a:hlinkClick r:id="rId4"/>
+              </a:rPr>
+              <a:t>http://docs.angularjs.org/api/ng.filter:filter</a:t>
+            </a:r>
+            <a:endParaRPr lang="en-US" dirty="0"/>
+          </a:p>
+          <a:p>
+            <a:pPr marL="457200" lvl="1" indent="0">
+              <a:buNone/>
+            </a:pPr>
             <a:endParaRPr lang="en-US" dirty="0" smtClean="0"/>
           </a:p>
         </p:txBody>
@@ -4051,7 +4291,11 @@
           <a:p>
             <a:r>
               <a:rPr lang="en-US" dirty="0" smtClean="0"/>
-              <a:t>Demo 4 –Filter and order</a:t>
+              <a:t>Demo 3 –</a:t>
+            </a:r>
+            <a:r>
+              <a:rPr lang="en-US" dirty="0" err="1" smtClean="0"/>
+              <a:t>RepeaT</a:t>
             </a:r>
             <a:endParaRPr lang="en-US" dirty="0"/>
           </a:p>
@@ -4060,7 +4304,7 @@
     </p:spTree>
     <p:extLst>
       <p:ext uri="{BB962C8B-B14F-4D97-AF65-F5344CB8AC3E}">
-        <p14:creationId xmlns:p14="http://schemas.microsoft.com/office/powerpoint/2010/main" val="2315377052"/>
+        <p14:creationId xmlns:p14="http://schemas.microsoft.com/office/powerpoint/2010/main" val="919005457"/>
       </p:ext>
     </p:extLst>
   </p:cSld>
@@ -4943,16 +5187,49 @@
 </file>
 
 <file path=customXml/item1.xml><?xml version="1.0" encoding="utf-8"?>
-<p:properties xmlns:p="http://schemas.microsoft.com/office/2006/metadata/properties" xmlns:xsi="http://www.w3.org/2001/XMLSchema-instance" xmlns:pc="http://schemas.microsoft.com/office/infopath/2007/PartnerControls">
-  <documentManagement>
-    <Description0 xmlns="1e37aee8-73ad-441e-bced-8b530ad9291b" xsi:nil="true"/>
-    <_dlc_DocId xmlns="52ad97b0-86c1-49b5-b544-c488bf38e7c0">SAZVWXQSR7YH-3011-15</_dlc_DocId>
-    <_dlc_DocIdUrl xmlns="52ad97b0-86c1-49b5-b544-c488bf38e7c0">
-      <Url>https://my.skylinetechnologies.com/Support/SalesMarketingCenter/branding/_layouts/15/DocIdRedir.aspx?ID=SAZVWXQSR7YH-3011-15</Url>
-      <Description>SAZVWXQSR7YH-3011-15</Description>
-    </_dlc_DocIdUrl>
-  </documentManagement>
-</p:properties>
+<?mso-contentType ?>
+<spe:Receivers xmlns:spe="http://schemas.microsoft.com/sharepoint/events">
+  <Receiver>
+    <Name>Document ID Generator</Name>
+    <Synchronization>Synchronous</Synchronization>
+    <Type>10001</Type>
+    <SequenceNumber>1000</SequenceNumber>
+    <Assembly>Microsoft.Office.DocumentManagement, Version=14.0.0.0, Culture=neutral, PublicKeyToken=71e9bce111e9429c</Assembly>
+    <Class>Microsoft.Office.DocumentManagement.Internal.DocIdHandler</Class>
+    <Data/>
+    <Filter/>
+  </Receiver>
+  <Receiver>
+    <Name>Document ID Generator</Name>
+    <Synchronization>Synchronous</Synchronization>
+    <Type>10002</Type>
+    <SequenceNumber>1001</SequenceNumber>
+    <Assembly>Microsoft.Office.DocumentManagement, Version=14.0.0.0, Culture=neutral, PublicKeyToken=71e9bce111e9429c</Assembly>
+    <Class>Microsoft.Office.DocumentManagement.Internal.DocIdHandler</Class>
+    <Data/>
+    <Filter/>
+  </Receiver>
+  <Receiver>
+    <Name>Document ID Generator</Name>
+    <Synchronization>Synchronous</Synchronization>
+    <Type>10004</Type>
+    <SequenceNumber>1002</SequenceNumber>
+    <Assembly>Microsoft.Office.DocumentManagement, Version=14.0.0.0, Culture=neutral, PublicKeyToken=71e9bce111e9429c</Assembly>
+    <Class>Microsoft.Office.DocumentManagement.Internal.DocIdHandler</Class>
+    <Data/>
+    <Filter/>
+  </Receiver>
+  <Receiver>
+    <Name>Document ID Generator</Name>
+    <Synchronization>Synchronous</Synchronization>
+    <Type>10006</Type>
+    <SequenceNumber>1003</SequenceNumber>
+    <Assembly>Microsoft.Office.DocumentManagement, Version=14.0.0.0, Culture=neutral, PublicKeyToken=71e9bce111e9429c</Assembly>
+    <Class>Microsoft.Office.DocumentManagement.Internal.DocIdHandler</Class>
+    <Data/>
+    <Filter/>
+  </Receiver>
+</spe:Receivers>
 </file>
 
 <file path=customXml/item2.xml><?xml version="1.0" encoding="utf-8"?>
@@ -5114,49 +5391,16 @@
 </file>
 
 <file path=customXml/item3.xml><?xml version="1.0" encoding="utf-8"?>
-<?mso-contentType ?>
-<spe:Receivers xmlns:spe="http://schemas.microsoft.com/sharepoint/events">
-  <Receiver>
-    <Name>Document ID Generator</Name>
-    <Synchronization>Synchronous</Synchronization>
-    <Type>10001</Type>
-    <SequenceNumber>1000</SequenceNumber>
-    <Assembly>Microsoft.Office.DocumentManagement, Version=14.0.0.0, Culture=neutral, PublicKeyToken=71e9bce111e9429c</Assembly>
-    <Class>Microsoft.Office.DocumentManagement.Internal.DocIdHandler</Class>
-    <Data/>
-    <Filter/>
-  </Receiver>
-  <Receiver>
-    <Name>Document ID Generator</Name>
-    <Synchronization>Synchronous</Synchronization>
-    <Type>10002</Type>
-    <SequenceNumber>1001</SequenceNumber>
-    <Assembly>Microsoft.Office.DocumentManagement, Version=14.0.0.0, Culture=neutral, PublicKeyToken=71e9bce111e9429c</Assembly>
-    <Class>Microsoft.Office.DocumentManagement.Internal.DocIdHandler</Class>
-    <Data/>
-    <Filter/>
-  </Receiver>
-  <Receiver>
-    <Name>Document ID Generator</Name>
-    <Synchronization>Synchronous</Synchronization>
-    <Type>10004</Type>
-    <SequenceNumber>1002</SequenceNumber>
-    <Assembly>Microsoft.Office.DocumentManagement, Version=14.0.0.0, Culture=neutral, PublicKeyToken=71e9bce111e9429c</Assembly>
-    <Class>Microsoft.Office.DocumentManagement.Internal.DocIdHandler</Class>
-    <Data/>
-    <Filter/>
-  </Receiver>
-  <Receiver>
-    <Name>Document ID Generator</Name>
-    <Synchronization>Synchronous</Synchronization>
-    <Type>10006</Type>
-    <SequenceNumber>1003</SequenceNumber>
-    <Assembly>Microsoft.Office.DocumentManagement, Version=14.0.0.0, Culture=neutral, PublicKeyToken=71e9bce111e9429c</Assembly>
-    <Class>Microsoft.Office.DocumentManagement.Internal.DocIdHandler</Class>
-    <Data/>
-    <Filter/>
-  </Receiver>
-</spe:Receivers>
+<p:properties xmlns:p="http://schemas.microsoft.com/office/2006/metadata/properties" xmlns:xsi="http://www.w3.org/2001/XMLSchema-instance" xmlns:pc="http://schemas.microsoft.com/office/infopath/2007/PartnerControls">
+  <documentManagement>
+    <Description0 xmlns="1e37aee8-73ad-441e-bced-8b530ad9291b" xsi:nil="true"/>
+    <_dlc_DocId xmlns="52ad97b0-86c1-49b5-b544-c488bf38e7c0">SAZVWXQSR7YH-3011-15</_dlc_DocId>
+    <_dlc_DocIdUrl xmlns="52ad97b0-86c1-49b5-b544-c488bf38e7c0">
+      <Url>https://my.skylinetechnologies.com/Support/SalesMarketingCenter/branding/_layouts/15/DocIdRedir.aspx?ID=SAZVWXQSR7YH-3011-15</Url>
+      <Description>SAZVWXQSR7YH-3011-15</Description>
+    </_dlc_DocIdUrl>
+  </documentManagement>
+</p:properties>
 </file>
 
 <file path=customXml/item4.xml><?xml version="1.0" encoding="utf-8"?>
@@ -5169,18 +5413,9 @@
 </file>
 
 <file path=customXml/itemProps1.xml><?xml version="1.0" encoding="utf-8"?>
-<ds:datastoreItem xmlns:ds="http://schemas.openxmlformats.org/officeDocument/2006/customXml" ds:itemID="{60DB4CE3-4EB9-4C5B-AB3E-621993C78A6D}">
+<ds:datastoreItem xmlns:ds="http://schemas.openxmlformats.org/officeDocument/2006/customXml" ds:itemID="{1AB308FA-87CC-4CE5-96AF-CCE6818F8A06}">
   <ds:schemaRefs>
-    <ds:schemaRef ds:uri="http://schemas.microsoft.com/office/2006/documentManagement/types"/>
-    <ds:schemaRef ds:uri="http://schemas.openxmlformats.org/package/2006/metadata/core-properties"/>
-    <ds:schemaRef ds:uri="http://purl.org/dc/elements/1.1/"/>
-    <ds:schemaRef ds:uri="http://schemas.microsoft.com/office/infopath/2007/PartnerControls"/>
-    <ds:schemaRef ds:uri="http://schemas.microsoft.com/office/2006/metadata/properties"/>
-    <ds:schemaRef ds:uri="http://purl.org/dc/terms/"/>
-    <ds:schemaRef ds:uri="52ad97b0-86c1-49b5-b544-c488bf38e7c0"/>
-    <ds:schemaRef ds:uri="1e37aee8-73ad-441e-bced-8b530ad9291b"/>
-    <ds:schemaRef ds:uri="http://www.w3.org/XML/1998/namespace"/>
-    <ds:schemaRef ds:uri="http://purl.org/dc/dcmitype/"/>
+    <ds:schemaRef ds:uri="http://schemas.microsoft.com/sharepoint/events"/>
   </ds:schemaRefs>
 </ds:datastoreItem>
 </file>
@@ -5205,9 +5440,18 @@
 </file>
 
 <file path=customXml/itemProps3.xml><?xml version="1.0" encoding="utf-8"?>
-<ds:datastoreItem xmlns:ds="http://schemas.openxmlformats.org/officeDocument/2006/customXml" ds:itemID="{1AB308FA-87CC-4CE5-96AF-CCE6818F8A06}">
+<ds:datastoreItem xmlns:ds="http://schemas.openxmlformats.org/officeDocument/2006/customXml" ds:itemID="{60DB4CE3-4EB9-4C5B-AB3E-621993C78A6D}">
   <ds:schemaRefs>
-    <ds:schemaRef ds:uri="http://schemas.microsoft.com/sharepoint/events"/>
+    <ds:schemaRef ds:uri="http://schemas.microsoft.com/office/2006/metadata/properties"/>
+    <ds:schemaRef ds:uri="52ad97b0-86c1-49b5-b544-c488bf38e7c0"/>
+    <ds:schemaRef ds:uri="http://purl.org/dc/elements/1.1/"/>
+    <ds:schemaRef ds:uri="http://schemas.openxmlformats.org/package/2006/metadata/core-properties"/>
+    <ds:schemaRef ds:uri="http://purl.org/dc/terms/"/>
+    <ds:schemaRef ds:uri="http://schemas.microsoft.com/office/infopath/2007/PartnerControls"/>
+    <ds:schemaRef ds:uri="http://schemas.microsoft.com/office/2006/documentManagement/types"/>
+    <ds:schemaRef ds:uri="1e37aee8-73ad-441e-bced-8b530ad9291b"/>
+    <ds:schemaRef ds:uri="http://www.w3.org/XML/1998/namespace"/>
+    <ds:schemaRef ds:uri="http://purl.org/dc/dcmitype/"/>
   </ds:schemaRefs>
 </ds:datastoreItem>
 </file>

</xml_diff>